<commit_message>
Updates to actions, stack, & monitors
Added/completed actions, implemented stack structure, and added some monitors/card implementations (more on the way)
</commit_message>
<xml_diff>
--- a/Reference Files/spellbook duels cards v3.2.pptx
+++ b/Reference Files/spellbook duels cards v3.2.pptx
@@ -142,10 +142,25 @@
   <pc:docChgLst>
     <pc:chgData name="Ryan Camp" userId="3a311172e72c241e" providerId="LiveId" clId="{6BF05E85-9445-5865-BECD-D0E792489950}"/>
     <pc:docChg chg="undo custSel modSld">
-      <pc:chgData name="Ryan Camp" userId="3a311172e72c241e" providerId="LiveId" clId="{6BF05E85-9445-5865-BECD-D0E792489950}" dt="2025-11-28T02:22:14.767" v="47" actId="20577"/>
+      <pc:chgData name="Ryan Camp" userId="3a311172e72c241e" providerId="LiveId" clId="{6BF05E85-9445-5865-BECD-D0E792489950}" dt="2025-11-28T05:11:17.773" v="62" actId="20577"/>
       <pc:docMkLst>
         <pc:docMk/>
       </pc:docMkLst>
+      <pc:sldChg chg="modSp mod">
+        <pc:chgData name="Ryan Camp" userId="3a311172e72c241e" providerId="LiveId" clId="{6BF05E85-9445-5865-BECD-D0E792489950}" dt="2025-11-28T05:11:17.773" v="62" actId="20577"/>
+        <pc:sldMkLst>
+          <pc:docMk/>
+          <pc:sldMk cId="130508862" sldId="271"/>
+        </pc:sldMkLst>
+        <pc:spChg chg="mod">
+          <ac:chgData name="Ryan Camp" userId="3a311172e72c241e" providerId="LiveId" clId="{6BF05E85-9445-5865-BECD-D0E792489950}" dt="2025-11-28T05:11:17.773" v="62" actId="20577"/>
+          <ac:spMkLst>
+            <pc:docMk/>
+            <pc:sldMk cId="130508862" sldId="271"/>
+            <ac:spMk id="52" creationId="{E31CFBBD-A6D1-44D4-B4AE-9ED595038BFD}"/>
+          </ac:spMkLst>
+        </pc:spChg>
+      </pc:sldChg>
       <pc:sldChg chg="modSp">
         <pc:chgData name="Ryan Camp" userId="3a311172e72c241e" providerId="LiveId" clId="{6BF05E85-9445-5865-BECD-D0E792489950}" dt="2025-11-28T02:13:21.459" v="22"/>
         <pc:sldMkLst>
@@ -10538,7 +10553,7 @@
           <a:p>
             <a:r>
               <a:rPr lang="en-US" dirty="0"/>
-              <a:t>Break a Curse. Each opponent takes 2 </a:t>
+              <a:t>Break an opponent’s Curse. Each opponent takes 2 </a:t>
             </a:r>
             <a:r>
               <a:rPr lang="en-US" dirty="0" err="1"/>
@@ -15693,15 +15708,7 @@
           <a:p>
             <a:r>
               <a:rPr lang="en-US" dirty="0"/>
-              <a:t>All damage that would be dealt to you </a:t>
-            </a:r>
-            <a:r>
-              <a:rPr lang="en-US"/>
-              <a:t>during your </a:t>
-            </a:r>
-            <a:r>
-              <a:rPr lang="en-US" dirty="0"/>
-              <a:t>defense phase is dealt to the attacking opponent instead.</a:t>
+              <a:t>All damage that would be dealt to you during your defense phase is dealt to the attacking opponent instead.</a:t>
             </a:r>
           </a:p>
         </p:txBody>

</xml_diff>